<commit_message>
Updated Aufgabe 1 Presentation
</commit_message>
<xml_diff>
--- a/Aufgabe01_Praesentation.pptx
+++ b/Aufgabe01_Praesentation.pptx
@@ -6434,13 +6434,13 @@
   <p:clrMapOvr>
     <a:masterClrMapping/>
   </p:clrMapOvr>
-  <mc:AlternateContent xmlns:mc="http://schemas.openxmlformats.org/markup-compatibility/2006">
-    <mc:Choice xmlns:p14="http://schemas.microsoft.com/office/powerpoint/2010/main" Requires="p14">
+  <mc:AlternateContent xmlns:mc="http://schemas.openxmlformats.org/markup-compatibility/2006" xmlns:p14="http://schemas.microsoft.com/office/powerpoint/2010/main">
+    <mc:Choice Requires="p14">
       <p:transition spd="med" p14:dur="700">
         <p:fade/>
       </p:transition>
     </mc:Choice>
-    <mc:Fallback>
+    <mc:Fallback xmlns="">
       <p:transition spd="med">
         <p:fade/>
       </p:transition>
@@ -7548,13 +7548,13 @@
   <p:clrMapOvr>
     <a:masterClrMapping/>
   </p:clrMapOvr>
-  <mc:AlternateContent xmlns:mc="http://schemas.openxmlformats.org/markup-compatibility/2006">
-    <mc:Choice xmlns:p14="http://schemas.microsoft.com/office/powerpoint/2010/main" Requires="p14">
+  <mc:AlternateContent xmlns:mc="http://schemas.openxmlformats.org/markup-compatibility/2006" xmlns:p14="http://schemas.microsoft.com/office/powerpoint/2010/main">
+    <mc:Choice Requires="p14">
       <p:transition spd="med" p14:dur="700">
         <p:fade/>
       </p:transition>
     </mc:Choice>
-    <mc:Fallback>
+    <mc:Fallback xmlns="">
       <p:transition spd="med">
         <p:fade/>
       </p:transition>
@@ -9123,13 +9123,13 @@
   <p:clrMapOvr>
     <a:masterClrMapping/>
   </p:clrMapOvr>
-  <mc:AlternateContent xmlns:mc="http://schemas.openxmlformats.org/markup-compatibility/2006">
-    <mc:Choice xmlns:p14="http://schemas.microsoft.com/office/powerpoint/2010/main" Requires="p14">
+  <mc:AlternateContent xmlns:mc="http://schemas.openxmlformats.org/markup-compatibility/2006" xmlns:p14="http://schemas.microsoft.com/office/powerpoint/2010/main">
+    <mc:Choice Requires="p14">
       <p:transition spd="med" p14:dur="700">
         <p:fade/>
       </p:transition>
     </mc:Choice>
-    <mc:Fallback>
+    <mc:Fallback xmlns="">
       <p:transition spd="med">
         <p:fade/>
       </p:transition>
@@ -9680,13 +9680,13 @@
   <p:clrMapOvr>
     <a:masterClrMapping/>
   </p:clrMapOvr>
-  <mc:AlternateContent xmlns:mc="http://schemas.openxmlformats.org/markup-compatibility/2006">
-    <mc:Choice xmlns:p14="http://schemas.microsoft.com/office/powerpoint/2010/main" Requires="p14">
+  <mc:AlternateContent xmlns:mc="http://schemas.openxmlformats.org/markup-compatibility/2006" xmlns:p14="http://schemas.microsoft.com/office/powerpoint/2010/main">
+    <mc:Choice Requires="p14">
       <p:transition spd="med" p14:dur="700">
         <p:fade/>
       </p:transition>
     </mc:Choice>
-    <mc:Fallback>
+    <mc:Fallback xmlns="">
       <p:transition spd="med">
         <p:fade/>
       </p:transition>
@@ -11228,13 +11228,13 @@
   <p:clrMapOvr>
     <a:masterClrMapping/>
   </p:clrMapOvr>
-  <mc:AlternateContent xmlns:mc="http://schemas.openxmlformats.org/markup-compatibility/2006">
-    <mc:Choice xmlns:p14="http://schemas.microsoft.com/office/powerpoint/2010/main" Requires="p14">
+  <mc:AlternateContent xmlns:mc="http://schemas.openxmlformats.org/markup-compatibility/2006" xmlns:p14="http://schemas.microsoft.com/office/powerpoint/2010/main">
+    <mc:Choice Requires="p14">
       <p:transition spd="med" p14:dur="700">
         <p:fade/>
       </p:transition>
     </mc:Choice>
-    <mc:Fallback>
+    <mc:Fallback xmlns="">
       <p:transition spd="med">
         <p:fade/>
       </p:transition>
@@ -13567,13 +13567,13 @@
   <p:clrMapOvr>
     <a:masterClrMapping/>
   </p:clrMapOvr>
-  <mc:AlternateContent xmlns:mc="http://schemas.openxmlformats.org/markup-compatibility/2006">
-    <mc:Choice xmlns:p14="http://schemas.microsoft.com/office/powerpoint/2010/main" Requires="p14">
+  <mc:AlternateContent xmlns:mc="http://schemas.openxmlformats.org/markup-compatibility/2006" xmlns:p14="http://schemas.microsoft.com/office/powerpoint/2010/main">
+    <mc:Choice Requires="p14">
       <p:transition spd="med" p14:dur="700">
         <p:fade/>
       </p:transition>
     </mc:Choice>
-    <mc:Fallback>
+    <mc:Fallback xmlns="">
       <p:transition spd="med">
         <p:fade/>
       </p:transition>
@@ -15554,13 +15554,13 @@
   <p:clrMapOvr>
     <a:masterClrMapping/>
   </p:clrMapOvr>
-  <mc:AlternateContent xmlns:mc="http://schemas.openxmlformats.org/markup-compatibility/2006">
-    <mc:Choice xmlns:p14="http://schemas.microsoft.com/office/powerpoint/2010/main" Requires="p14">
+  <mc:AlternateContent xmlns:mc="http://schemas.openxmlformats.org/markup-compatibility/2006" xmlns:p14="http://schemas.microsoft.com/office/powerpoint/2010/main">
+    <mc:Choice Requires="p14">
       <p:transition spd="med" p14:dur="700">
         <p:fade/>
       </p:transition>
     </mc:Choice>
-    <mc:Fallback>
+    <mc:Fallback xmlns="">
       <p:transition spd="med">
         <p:fade/>
       </p:transition>
@@ -17082,13 +17082,13 @@
   <p:clrMapOvr>
     <a:masterClrMapping/>
   </p:clrMapOvr>
-  <mc:AlternateContent xmlns:mc="http://schemas.openxmlformats.org/markup-compatibility/2006">
-    <mc:Choice xmlns:p14="http://schemas.microsoft.com/office/powerpoint/2010/main" Requires="p14">
+  <mc:AlternateContent xmlns:mc="http://schemas.openxmlformats.org/markup-compatibility/2006" xmlns:p14="http://schemas.microsoft.com/office/powerpoint/2010/main">
+    <mc:Choice Requires="p14">
       <p:transition spd="med" p14:dur="700">
         <p:fade/>
       </p:transition>
     </mc:Choice>
-    <mc:Fallback>
+    <mc:Fallback xmlns="">
       <p:transition spd="med">
         <p:fade/>
       </p:transition>
@@ -18173,13 +18173,13 @@
   <p:clrMapOvr>
     <a:masterClrMapping/>
   </p:clrMapOvr>
-  <mc:AlternateContent xmlns:mc="http://schemas.openxmlformats.org/markup-compatibility/2006">
-    <mc:Choice xmlns:p14="http://schemas.microsoft.com/office/powerpoint/2010/main" Requires="p14">
+  <mc:AlternateContent xmlns:mc="http://schemas.openxmlformats.org/markup-compatibility/2006" xmlns:p14="http://schemas.microsoft.com/office/powerpoint/2010/main">
+    <mc:Choice Requires="p14">
       <p:transition spd="med" p14:dur="700">
         <p:fade/>
       </p:transition>
     </mc:Choice>
-    <mc:Fallback>
+    <mc:Fallback xmlns="">
       <p:transition spd="med">
         <p:fade/>
       </p:transition>
@@ -19114,13 +19114,13 @@
   <p:clrMapOvr>
     <a:masterClrMapping/>
   </p:clrMapOvr>
-  <mc:AlternateContent xmlns:mc="http://schemas.openxmlformats.org/markup-compatibility/2006">
-    <mc:Choice xmlns:p14="http://schemas.microsoft.com/office/powerpoint/2010/main" Requires="p14">
+  <mc:AlternateContent xmlns:mc="http://schemas.openxmlformats.org/markup-compatibility/2006" xmlns:p14="http://schemas.microsoft.com/office/powerpoint/2010/main">
+    <mc:Choice Requires="p14">
       <p:transition spd="med" p14:dur="700">
         <p:fade/>
       </p:transition>
     </mc:Choice>
-    <mc:Fallback>
+    <mc:Fallback xmlns="">
       <p:transition spd="med">
         <p:fade/>
       </p:transition>
@@ -19240,13 +19240,13 @@
   <p:clrMapOvr>
     <a:masterClrMapping/>
   </p:clrMapOvr>
-  <mc:AlternateContent xmlns:mc="http://schemas.openxmlformats.org/markup-compatibility/2006">
-    <mc:Choice xmlns:p14="http://schemas.microsoft.com/office/powerpoint/2010/main" Requires="p14">
+  <mc:AlternateContent xmlns:mc="http://schemas.openxmlformats.org/markup-compatibility/2006" xmlns:p14="http://schemas.microsoft.com/office/powerpoint/2010/main">
+    <mc:Choice Requires="p14">
       <p:transition spd="med" p14:dur="700">
         <p:fade/>
       </p:transition>
     </mc:Choice>
-    <mc:Fallback>
+    <mc:Fallback xmlns="">
       <p:transition spd="med">
         <p:fade/>
       </p:transition>
@@ -19588,13 +19588,13 @@
   <p:clrMapOvr>
     <a:masterClrMapping/>
   </p:clrMapOvr>
-  <mc:AlternateContent xmlns:mc="http://schemas.openxmlformats.org/markup-compatibility/2006">
-    <mc:Choice xmlns:p14="http://schemas.microsoft.com/office/powerpoint/2010/main" Requires="p14">
+  <mc:AlternateContent xmlns:mc="http://schemas.openxmlformats.org/markup-compatibility/2006" xmlns:p14="http://schemas.microsoft.com/office/powerpoint/2010/main">
+    <mc:Choice Requires="p14">
       <p:transition spd="med" p14:dur="700">
         <p:fade/>
       </p:transition>
     </mc:Choice>
-    <mc:Fallback>
+    <mc:Fallback xmlns="">
       <p:transition spd="med">
         <p:fade/>
       </p:transition>
@@ -21214,13 +21214,13 @@
   <p:clrMapOvr>
     <a:masterClrMapping/>
   </p:clrMapOvr>
-  <mc:AlternateContent xmlns:mc="http://schemas.openxmlformats.org/markup-compatibility/2006">
-    <mc:Choice xmlns:p14="http://schemas.microsoft.com/office/powerpoint/2010/main" Requires="p14">
+  <mc:AlternateContent xmlns:mc="http://schemas.openxmlformats.org/markup-compatibility/2006" xmlns:p14="http://schemas.microsoft.com/office/powerpoint/2010/main">
+    <mc:Choice Requires="p14">
       <p:transition spd="med" p14:dur="700">
         <p:fade/>
       </p:transition>
     </mc:Choice>
-    <mc:Fallback>
+    <mc:Fallback xmlns="">
       <p:transition spd="med">
         <p:fade/>
       </p:transition>
@@ -22006,13 +22006,13 @@
   <p:clrMapOvr>
     <a:masterClrMapping/>
   </p:clrMapOvr>
-  <mc:AlternateContent xmlns:mc="http://schemas.openxmlformats.org/markup-compatibility/2006">
-    <mc:Choice xmlns:p14="http://schemas.microsoft.com/office/powerpoint/2010/main" Requires="p14">
+  <mc:AlternateContent xmlns:mc="http://schemas.openxmlformats.org/markup-compatibility/2006" xmlns:p14="http://schemas.microsoft.com/office/powerpoint/2010/main">
+    <mc:Choice Requires="p14">
       <p:transition spd="med" p14:dur="700">
         <p:fade/>
       </p:transition>
     </mc:Choice>
-    <mc:Fallback>
+    <mc:Fallback xmlns="">
       <p:transition spd="med">
         <p:fade/>
       </p:transition>
@@ -23946,13 +23946,13 @@
   <p:clrMapOvr>
     <a:masterClrMapping/>
   </p:clrMapOvr>
-  <mc:AlternateContent xmlns:mc="http://schemas.openxmlformats.org/markup-compatibility/2006">
-    <mc:Choice xmlns:p14="http://schemas.microsoft.com/office/powerpoint/2010/main" Requires="p14">
+  <mc:AlternateContent xmlns:mc="http://schemas.openxmlformats.org/markup-compatibility/2006" xmlns:p14="http://schemas.microsoft.com/office/powerpoint/2010/main">
+    <mc:Choice Requires="p14">
       <p:transition spd="med" p14:dur="700">
         <p:fade/>
       </p:transition>
     </mc:Choice>
-    <mc:Fallback>
+    <mc:Fallback xmlns="">
       <p:transition spd="med">
         <p:fade/>
       </p:transition>
@@ -29063,13 +29063,13 @@
   <p:clrMapOvr>
     <a:masterClrMapping/>
   </p:clrMapOvr>
-  <mc:AlternateContent xmlns:mc="http://schemas.openxmlformats.org/markup-compatibility/2006">
-    <mc:Choice xmlns:p14="http://schemas.microsoft.com/office/powerpoint/2010/main" Requires="p14">
+  <mc:AlternateContent xmlns:mc="http://schemas.openxmlformats.org/markup-compatibility/2006" xmlns:p14="http://schemas.microsoft.com/office/powerpoint/2010/main">
+    <mc:Choice Requires="p14">
       <p:transition spd="med" p14:dur="700">
         <p:fade/>
       </p:transition>
     </mc:Choice>
-    <mc:Fallback>
+    <mc:Fallback xmlns="">
       <p:transition spd="med">
         <p:fade/>
       </p:transition>
@@ -31448,13 +31448,13 @@
   <p:clrMapOvr>
     <a:masterClrMapping/>
   </p:clrMapOvr>
-  <mc:AlternateContent xmlns:mc="http://schemas.openxmlformats.org/markup-compatibility/2006">
-    <mc:Choice xmlns:p14="http://schemas.microsoft.com/office/powerpoint/2010/main" Requires="p14">
+  <mc:AlternateContent xmlns:mc="http://schemas.openxmlformats.org/markup-compatibility/2006" xmlns:p14="http://schemas.microsoft.com/office/powerpoint/2010/main">
+    <mc:Choice Requires="p14">
       <p:transition spd="med" p14:dur="700">
         <p:fade/>
       </p:transition>
     </mc:Choice>
-    <mc:Fallback>
+    <mc:Fallback xmlns="">
       <p:transition spd="med">
         <p:fade/>
       </p:transition>
@@ -33656,13 +33656,13 @@
   <p:clrMapOvr>
     <a:masterClrMapping/>
   </p:clrMapOvr>
-  <mc:AlternateContent xmlns:mc="http://schemas.openxmlformats.org/markup-compatibility/2006">
-    <mc:Choice xmlns:p14="http://schemas.microsoft.com/office/powerpoint/2010/main" Requires="p14">
+  <mc:AlternateContent xmlns:mc="http://schemas.openxmlformats.org/markup-compatibility/2006" xmlns:p14="http://schemas.microsoft.com/office/powerpoint/2010/main">
+    <mc:Choice Requires="p14">
       <p:transition spd="med" p14:dur="700">
         <p:fade/>
       </p:transition>
     </mc:Choice>
-    <mc:Fallback>
+    <mc:Fallback xmlns="">
       <p:transition spd="med">
         <p:fade/>
       </p:transition>
@@ -35520,13 +35520,13 @@
   <p:clrMapOvr>
     <a:masterClrMapping/>
   </p:clrMapOvr>
-  <mc:AlternateContent xmlns:mc="http://schemas.openxmlformats.org/markup-compatibility/2006">
-    <mc:Choice xmlns:p14="http://schemas.microsoft.com/office/powerpoint/2010/main" Requires="p14">
+  <mc:AlternateContent xmlns:mc="http://schemas.openxmlformats.org/markup-compatibility/2006" xmlns:p14="http://schemas.microsoft.com/office/powerpoint/2010/main">
+    <mc:Choice Requires="p14">
       <p:transition spd="med" p14:dur="700">
         <p:fade/>
       </p:transition>
     </mc:Choice>
-    <mc:Fallback>
+    <mc:Fallback xmlns="">
       <p:transition spd="med">
         <p:fade/>
       </p:transition>
@@ -37306,13 +37306,13 @@
   <p:clrMapOvr>
     <a:masterClrMapping/>
   </p:clrMapOvr>
-  <mc:AlternateContent xmlns:mc="http://schemas.openxmlformats.org/markup-compatibility/2006">
-    <mc:Choice xmlns:p14="http://schemas.microsoft.com/office/powerpoint/2010/main" Requires="p14">
+  <mc:AlternateContent xmlns:mc="http://schemas.openxmlformats.org/markup-compatibility/2006" xmlns:p14="http://schemas.microsoft.com/office/powerpoint/2010/main">
+    <mc:Choice Requires="p14">
       <p:transition spd="med" p14:dur="700">
         <p:fade/>
       </p:transition>
     </mc:Choice>
-    <mc:Fallback>
+    <mc:Fallback xmlns="">
       <p:transition spd="med">
         <p:fade/>
       </p:transition>
@@ -38801,13 +38801,13 @@
   <p:clrMapOvr>
     <a:masterClrMapping/>
   </p:clrMapOvr>
-  <mc:AlternateContent xmlns:mc="http://schemas.openxmlformats.org/markup-compatibility/2006">
-    <mc:Choice xmlns:p14="http://schemas.microsoft.com/office/powerpoint/2010/main" Requires="p14">
+  <mc:AlternateContent xmlns:mc="http://schemas.openxmlformats.org/markup-compatibility/2006" xmlns:p14="http://schemas.microsoft.com/office/powerpoint/2010/main">
+    <mc:Choice Requires="p14">
       <p:transition spd="med" p14:dur="700">
         <p:fade/>
       </p:transition>
     </mc:Choice>
-    <mc:Fallback>
+    <mc:Fallback xmlns="">
       <p:transition spd="med">
         <p:fade/>
       </p:transition>
@@ -39501,13 +39501,13 @@
   <p:clrMapOvr>
     <a:masterClrMapping/>
   </p:clrMapOvr>
-  <mc:AlternateContent xmlns:mc="http://schemas.openxmlformats.org/markup-compatibility/2006">
-    <mc:Choice xmlns:p14="http://schemas.microsoft.com/office/powerpoint/2010/main" Requires="p14">
+  <mc:AlternateContent xmlns:mc="http://schemas.openxmlformats.org/markup-compatibility/2006" xmlns:p14="http://schemas.microsoft.com/office/powerpoint/2010/main">
+    <mc:Choice Requires="p14">
       <p:transition spd="med" p14:dur="700">
         <p:fade/>
       </p:transition>
     </mc:Choice>
-    <mc:Fallback>
+    <mc:Fallback xmlns="">
       <p:transition spd="med">
         <p:fade/>
       </p:transition>
@@ -40395,13 +40395,13 @@
   <p:clrMapOvr>
     <a:masterClrMapping/>
   </p:clrMapOvr>
-  <mc:AlternateContent xmlns:mc="http://schemas.openxmlformats.org/markup-compatibility/2006">
-    <mc:Choice xmlns:p14="http://schemas.microsoft.com/office/powerpoint/2010/main" Requires="p14">
+  <mc:AlternateContent xmlns:mc="http://schemas.openxmlformats.org/markup-compatibility/2006" xmlns:p14="http://schemas.microsoft.com/office/powerpoint/2010/main">
+    <mc:Choice Requires="p14">
       <p:transition spd="med" p14:dur="700">
         <p:fade/>
       </p:transition>
     </mc:Choice>
-    <mc:Fallback>
+    <mc:Fallback xmlns="">
       <p:transition spd="med">
         <p:fade/>
       </p:transition>
@@ -41735,13 +41735,13 @@
   <p:clrMapOvr>
     <a:masterClrMapping/>
   </p:clrMapOvr>
-  <mc:AlternateContent xmlns:mc="http://schemas.openxmlformats.org/markup-compatibility/2006">
-    <mc:Choice xmlns:p14="http://schemas.microsoft.com/office/powerpoint/2010/main" Requires="p14">
+  <mc:AlternateContent xmlns:mc="http://schemas.openxmlformats.org/markup-compatibility/2006" xmlns:p14="http://schemas.microsoft.com/office/powerpoint/2010/main">
+    <mc:Choice Requires="p14">
       <p:transition spd="med" p14:dur="700">
         <p:fade/>
       </p:transition>
     </mc:Choice>
-    <mc:Fallback>
+    <mc:Fallback xmlns="">
       <p:transition spd="med">
         <p:fade/>
       </p:transition>
@@ -41775,6 +41775,55 @@
           <a:chExt cx="0" cy="0"/>
         </a:xfrm>
       </p:grpSpPr>
+      <p:sp>
+        <p:nvSpPr>
+          <p:cNvPr id="2" name="Rechteck 1">
+            <a:extLst>
+              <a:ext uri="{FF2B5EF4-FFF2-40B4-BE49-F238E27FC236}">
+                <a16:creationId xmlns:a16="http://schemas.microsoft.com/office/drawing/2014/main" id="{9B83988B-490B-441F-B2F9-4E7DE8D23E16}"/>
+              </a:ext>
+            </a:extLst>
+          </p:cNvPr>
+          <p:cNvSpPr/>
+          <p:nvPr/>
+        </p:nvSpPr>
+        <p:spPr>
+          <a:xfrm>
+            <a:off x="-123825" y="-66675"/>
+            <a:ext cx="12563475" cy="7248525"/>
+          </a:xfrm>
+          <a:prstGeom prst="rect">
+            <a:avLst/>
+          </a:prstGeom>
+          <a:solidFill>
+            <a:srgbClr val="272822"/>
+          </a:solidFill>
+        </p:spPr>
+        <p:style>
+          <a:lnRef idx="2">
+            <a:schemeClr val="accent1">
+              <a:shade val="50000"/>
+            </a:schemeClr>
+          </a:lnRef>
+          <a:fillRef idx="1">
+            <a:schemeClr val="accent1"/>
+          </a:fillRef>
+          <a:effectRef idx="0">
+            <a:schemeClr val="accent1"/>
+          </a:effectRef>
+          <a:fontRef idx="minor">
+            <a:schemeClr val="lt1"/>
+          </a:fontRef>
+        </p:style>
+        <p:txBody>
+          <a:bodyPr rtlCol="0" anchor="ctr"/>
+          <a:lstStyle/>
+          <a:p>
+            <a:pPr algn="ctr"/>
+            <a:endParaRPr lang="de-DE"/>
+          </a:p>
+        </p:txBody>
+      </p:sp>
       <p:pic>
         <p:nvPicPr>
           <p:cNvPr id="5" name="Grafik 4">
@@ -41797,7 +41846,7 @@
         </p:blipFill>
         <p:spPr>
           <a:xfrm>
-            <a:off x="95250" y="280268"/>
+            <a:off x="95250" y="560536"/>
             <a:ext cx="11919857" cy="6297464"/>
           </a:xfrm>
           <a:prstGeom prst="rect">
@@ -41815,13 +41864,13 @@
   <p:clrMapOvr>
     <a:masterClrMapping/>
   </p:clrMapOvr>
-  <mc:AlternateContent xmlns:mc="http://schemas.openxmlformats.org/markup-compatibility/2006">
-    <mc:Choice xmlns:p14="http://schemas.microsoft.com/office/powerpoint/2010/main" Requires="p14">
+  <mc:AlternateContent xmlns:mc="http://schemas.openxmlformats.org/markup-compatibility/2006" xmlns:p14="http://schemas.microsoft.com/office/powerpoint/2010/main">
+    <mc:Choice Requires="p14">
       <p:transition spd="med" p14:dur="700">
         <p:fade/>
       </p:transition>
     </mc:Choice>
-    <mc:Fallback>
+    <mc:Fallback xmlns="">
       <p:transition spd="med">
         <p:fade/>
       </p:transition>
@@ -41855,6 +41904,55 @@
           <a:chExt cx="0" cy="0"/>
         </a:xfrm>
       </p:grpSpPr>
+      <p:sp>
+        <p:nvSpPr>
+          <p:cNvPr id="2" name="Rechteck 1">
+            <a:extLst>
+              <a:ext uri="{FF2B5EF4-FFF2-40B4-BE49-F238E27FC236}">
+                <a16:creationId xmlns:a16="http://schemas.microsoft.com/office/drawing/2014/main" id="{E5B8CFD5-2733-48CE-8A66-FD5709B0414D}"/>
+              </a:ext>
+            </a:extLst>
+          </p:cNvPr>
+          <p:cNvSpPr/>
+          <p:nvPr/>
+        </p:nvSpPr>
+        <p:spPr>
+          <a:xfrm>
+            <a:off x="-85725" y="-142875"/>
+            <a:ext cx="12382500" cy="7143750"/>
+          </a:xfrm>
+          <a:prstGeom prst="rect">
+            <a:avLst/>
+          </a:prstGeom>
+          <a:solidFill>
+            <a:srgbClr val="272822"/>
+          </a:solidFill>
+        </p:spPr>
+        <p:style>
+          <a:lnRef idx="2">
+            <a:schemeClr val="accent1">
+              <a:shade val="50000"/>
+            </a:schemeClr>
+          </a:lnRef>
+          <a:fillRef idx="1">
+            <a:schemeClr val="accent1"/>
+          </a:fillRef>
+          <a:effectRef idx="0">
+            <a:schemeClr val="accent1"/>
+          </a:effectRef>
+          <a:fontRef idx="minor">
+            <a:schemeClr val="lt1"/>
+          </a:fontRef>
+        </p:style>
+        <p:txBody>
+          <a:bodyPr rtlCol="0" anchor="ctr"/>
+          <a:lstStyle/>
+          <a:p>
+            <a:pPr algn="ctr"/>
+            <a:endParaRPr lang="de-DE"/>
+          </a:p>
+        </p:txBody>
+      </p:sp>
       <p:pic>
         <p:nvPicPr>
           <p:cNvPr id="5" name="Grafik 4">
@@ -41877,7 +41975,7 @@
         </p:blipFill>
         <p:spPr>
           <a:xfrm>
-            <a:off x="95250" y="60456"/>
+            <a:off x="95250" y="22356"/>
             <a:ext cx="8995175" cy="6737088"/>
           </a:xfrm>
           <a:prstGeom prst="rect">
@@ -41946,8 +42044,8 @@
           </a:p>
         </p:txBody>
       </p:sp>
-      <mc:AlternateContent xmlns:mc="http://schemas.openxmlformats.org/markup-compatibility/2006">
-        <mc:Choice xmlns:a14="http://schemas.microsoft.com/office/drawing/2010/main" Requires="a14">
+      <mc:AlternateContent xmlns:mc="http://schemas.openxmlformats.org/markup-compatibility/2006" xmlns:a14="http://schemas.microsoft.com/office/drawing/2010/main">
+        <mc:Choice Requires="a14">
           <p:sp>
             <p:nvSpPr>
               <p:cNvPr id="3" name="Inhaltsplatzhalter 2">
@@ -42024,7 +42122,7 @@
             </p:txBody>
           </p:sp>
         </mc:Choice>
-        <mc:Fallback>
+        <mc:Fallback xmlns="">
           <p:sp>
             <p:nvSpPr>
               <p:cNvPr id="3" name="Inhaltsplatzhalter 2">
@@ -42078,13 +42176,13 @@
   <p:clrMapOvr>
     <a:masterClrMapping/>
   </p:clrMapOvr>
-  <mc:AlternateContent xmlns:mc="http://schemas.openxmlformats.org/markup-compatibility/2006">
-    <mc:Choice xmlns:p14="http://schemas.microsoft.com/office/powerpoint/2010/main" Requires="p14">
+  <mc:AlternateContent xmlns:mc="http://schemas.openxmlformats.org/markup-compatibility/2006" xmlns:p14="http://schemas.microsoft.com/office/powerpoint/2010/main">
+    <mc:Choice Requires="p14">
       <p:transition spd="med" p14:dur="700">
         <p:fade/>
       </p:transition>
     </mc:Choice>
-    <mc:Fallback>
+    <mc:Fallback xmlns="">
       <p:transition spd="med">
         <p:fade/>
       </p:transition>
@@ -42158,13 +42256,13 @@
   <p:clrMapOvr>
     <a:masterClrMapping/>
   </p:clrMapOvr>
-  <mc:AlternateContent xmlns:mc="http://schemas.openxmlformats.org/markup-compatibility/2006">
-    <mc:Choice xmlns:p14="http://schemas.microsoft.com/office/powerpoint/2010/main" Requires="p14">
+  <mc:AlternateContent xmlns:mc="http://schemas.openxmlformats.org/markup-compatibility/2006" xmlns:p14="http://schemas.microsoft.com/office/powerpoint/2010/main">
+    <mc:Choice Requires="p14">
       <p:transition spd="med" p14:dur="700">
         <p:fade/>
       </p:transition>
     </mc:Choice>
-    <mc:Fallback>
+    <mc:Fallback xmlns="">
       <p:transition spd="med">
         <p:fade/>
       </p:transition>
@@ -42324,13 +42422,13 @@
   <p:clrMapOvr>
     <a:masterClrMapping/>
   </p:clrMapOvr>
-  <mc:AlternateContent xmlns:mc="http://schemas.openxmlformats.org/markup-compatibility/2006">
-    <mc:Choice xmlns:p14="http://schemas.microsoft.com/office/powerpoint/2010/main" Requires="p14">
+  <mc:AlternateContent xmlns:mc="http://schemas.openxmlformats.org/markup-compatibility/2006" xmlns:p14="http://schemas.microsoft.com/office/powerpoint/2010/main">
+    <mc:Choice Requires="p14">
       <p:transition spd="med" p14:dur="700">
         <p:fade/>
       </p:transition>
     </mc:Choice>
-    <mc:Fallback>
+    <mc:Fallback xmlns="">
       <p:transition spd="med">
         <p:fade/>
       </p:transition>
@@ -42667,13 +42765,13 @@
   <p:clrMapOvr>
     <a:masterClrMapping/>
   </p:clrMapOvr>
-  <mc:AlternateContent xmlns:mc="http://schemas.openxmlformats.org/markup-compatibility/2006">
-    <mc:Choice xmlns:p14="http://schemas.microsoft.com/office/powerpoint/2010/main" Requires="p14">
+  <mc:AlternateContent xmlns:mc="http://schemas.openxmlformats.org/markup-compatibility/2006" xmlns:p14="http://schemas.microsoft.com/office/powerpoint/2010/main">
+    <mc:Choice Requires="p14">
       <p:transition spd="med" p14:dur="700">
         <p:fade/>
       </p:transition>
     </mc:Choice>
-    <mc:Fallback>
+    <mc:Fallback xmlns="">
       <p:transition spd="med">
         <p:fade/>
       </p:transition>
@@ -42875,13 +42973,13 @@
   <p:clrMapOvr>
     <a:masterClrMapping/>
   </p:clrMapOvr>
-  <mc:AlternateContent xmlns:mc="http://schemas.openxmlformats.org/markup-compatibility/2006">
-    <mc:Choice xmlns:p14="http://schemas.microsoft.com/office/powerpoint/2010/main" Requires="p14">
+  <mc:AlternateContent xmlns:mc="http://schemas.openxmlformats.org/markup-compatibility/2006" xmlns:p14="http://schemas.microsoft.com/office/powerpoint/2010/main">
+    <mc:Choice Requires="p14">
       <p:transition spd="med" p14:dur="700">
         <p:fade/>
       </p:transition>
     </mc:Choice>
-    <mc:Fallback>
+    <mc:Fallback xmlns="">
       <p:transition spd="med">
         <p:fade/>
       </p:transition>
@@ -42962,13 +43060,13 @@
   <p:clrMapOvr>
     <a:masterClrMapping/>
   </p:clrMapOvr>
-  <mc:AlternateContent xmlns:mc="http://schemas.openxmlformats.org/markup-compatibility/2006">
-    <mc:Choice xmlns:p14="http://schemas.microsoft.com/office/powerpoint/2010/main" Requires="p14">
+  <mc:AlternateContent xmlns:mc="http://schemas.openxmlformats.org/markup-compatibility/2006" xmlns:p14="http://schemas.microsoft.com/office/powerpoint/2010/main">
+    <mc:Choice Requires="p14">
       <p:transition spd="med" p14:dur="700">
         <p:fade/>
       </p:transition>
     </mc:Choice>
-    <mc:Fallback>
+    <mc:Fallback xmlns="">
       <p:transition spd="med">
         <p:fade/>
       </p:transition>
@@ -43084,13 +43182,13 @@
   <p:clrMapOvr>
     <a:masterClrMapping/>
   </p:clrMapOvr>
-  <mc:AlternateContent xmlns:mc="http://schemas.openxmlformats.org/markup-compatibility/2006">
-    <mc:Choice xmlns:p14="http://schemas.microsoft.com/office/powerpoint/2010/main" Requires="p14">
+  <mc:AlternateContent xmlns:mc="http://schemas.openxmlformats.org/markup-compatibility/2006" xmlns:p14="http://schemas.microsoft.com/office/powerpoint/2010/main">
+    <mc:Choice Requires="p14">
       <p:transition spd="med" p14:dur="700">
         <p:fade/>
       </p:transition>
     </mc:Choice>
-    <mc:Fallback>
+    <mc:Fallback xmlns="">
       <p:transition spd="med">
         <p:fade/>
       </p:transition>
@@ -43756,13 +43854,13 @@
   <p:clrMapOvr>
     <a:masterClrMapping/>
   </p:clrMapOvr>
-  <mc:AlternateContent xmlns:mc="http://schemas.openxmlformats.org/markup-compatibility/2006">
-    <mc:Choice xmlns:p14="http://schemas.microsoft.com/office/powerpoint/2010/main" Requires="p14">
+  <mc:AlternateContent xmlns:mc="http://schemas.openxmlformats.org/markup-compatibility/2006" xmlns:p14="http://schemas.microsoft.com/office/powerpoint/2010/main">
+    <mc:Choice Requires="p14">
       <p:transition spd="med" p14:dur="700">
         <p:fade/>
       </p:transition>
     </mc:Choice>
-    <mc:Fallback>
+    <mc:Fallback xmlns="">
       <p:transition spd="med">
         <p:fade/>
       </p:transition>
@@ -44650,13 +44748,13 @@
   <p:clrMapOvr>
     <a:masterClrMapping/>
   </p:clrMapOvr>
-  <mc:AlternateContent xmlns:mc="http://schemas.openxmlformats.org/markup-compatibility/2006">
-    <mc:Choice xmlns:p14="http://schemas.microsoft.com/office/powerpoint/2010/main" Requires="p14">
+  <mc:AlternateContent xmlns:mc="http://schemas.openxmlformats.org/markup-compatibility/2006" xmlns:p14="http://schemas.microsoft.com/office/powerpoint/2010/main">
+    <mc:Choice Requires="p14">
       <p:transition spd="med" p14:dur="700">
         <p:fade/>
       </p:transition>
     </mc:Choice>
-    <mc:Fallback>
+    <mc:Fallback xmlns="">
       <p:transition spd="med">
         <p:fade/>
       </p:transition>
@@ -45314,13 +45412,13 @@
   <p:clrMapOvr>
     <a:masterClrMapping/>
   </p:clrMapOvr>
-  <mc:AlternateContent xmlns:mc="http://schemas.openxmlformats.org/markup-compatibility/2006">
-    <mc:Choice xmlns:p14="http://schemas.microsoft.com/office/powerpoint/2010/main" Requires="p14">
+  <mc:AlternateContent xmlns:mc="http://schemas.openxmlformats.org/markup-compatibility/2006" xmlns:p14="http://schemas.microsoft.com/office/powerpoint/2010/main">
+    <mc:Choice Requires="p14">
       <p:transition spd="med" p14:dur="700">
         <p:fade/>
       </p:transition>
     </mc:Choice>
-    <mc:Fallback>
+    <mc:Fallback xmlns="">
       <p:transition spd="med">
         <p:fade/>
       </p:transition>
@@ -46186,13 +46284,13 @@
   <p:clrMapOvr>
     <a:masterClrMapping/>
   </p:clrMapOvr>
-  <mc:AlternateContent xmlns:mc="http://schemas.openxmlformats.org/markup-compatibility/2006">
-    <mc:Choice xmlns:p14="http://schemas.microsoft.com/office/powerpoint/2010/main" Requires="p14">
+  <mc:AlternateContent xmlns:mc="http://schemas.openxmlformats.org/markup-compatibility/2006" xmlns:p14="http://schemas.microsoft.com/office/powerpoint/2010/main">
+    <mc:Choice Requires="p14">
       <p:transition spd="med" p14:dur="700">
         <p:fade/>
       </p:transition>
     </mc:Choice>
-    <mc:Fallback>
+    <mc:Fallback xmlns="">
       <p:transition spd="med">
         <p:fade/>
       </p:transition>
@@ -47135,13 +47233,13 @@
   <p:clrMapOvr>
     <a:masterClrMapping/>
   </p:clrMapOvr>
-  <mc:AlternateContent xmlns:mc="http://schemas.openxmlformats.org/markup-compatibility/2006">
-    <mc:Choice xmlns:p14="http://schemas.microsoft.com/office/powerpoint/2010/main" Requires="p14">
+  <mc:AlternateContent xmlns:mc="http://schemas.openxmlformats.org/markup-compatibility/2006" xmlns:p14="http://schemas.microsoft.com/office/powerpoint/2010/main">
+    <mc:Choice Requires="p14">
       <p:transition spd="med" p14:dur="700">
         <p:fade/>
       </p:transition>
     </mc:Choice>
-    <mc:Fallback>
+    <mc:Fallback xmlns="">
       <p:transition spd="med">
         <p:fade/>
       </p:transition>

</xml_diff>

<commit_message>
Finished Aufgabe 1 Presentation
</commit_message>
<xml_diff>
--- a/Aufgabe01_Praesentation.pptx
+++ b/Aufgabe01_Praesentation.pptx
@@ -572,26 +572,6 @@
               <a:t>Internationale Informatikolympiade</a:t>
             </a:r>
           </a:p>
-          <a:p>
-            <a:r>
-              <a:rPr lang="de-DE" dirty="0"/>
-              <a:t>Einstieg</a:t>
-            </a:r>
-            <a:r>
-              <a:rPr lang="de-DE" baseline="0" dirty="0"/>
-              <a:t> zum Aufwärmen</a:t>
-            </a:r>
-          </a:p>
-          <a:p>
-            <a:r>
-              <a:rPr lang="de-DE" baseline="0" dirty="0"/>
-              <a:t>Informatik Biber 2017</a:t>
-            </a:r>
-            <a:endParaRPr lang="de-DE" dirty="0"/>
-          </a:p>
-          <a:p>
-            <a:endParaRPr lang="de-DE" dirty="0"/>
-          </a:p>
         </p:txBody>
       </p:sp>
       <p:sp>
@@ -674,14 +654,6 @@
           <a:bodyPr/>
           <a:lstStyle/>
           <a:p>
-            <a:r>
-              <a:rPr lang="de-DE" dirty="0"/>
-              <a:t>(Wenn</a:t>
-            </a:r>
-            <a:r>
-              <a:rPr lang="de-DE" baseline="0" dirty="0"/>
-              <a:t> halt nix mehr geht) – würde Computer nicht weiterhelfen…</a:t>
-            </a:r>
             <a:endParaRPr lang="de-DE" dirty="0"/>
           </a:p>
         </p:txBody>
@@ -766,14 +738,6 @@
           <a:bodyPr/>
           <a:lstStyle/>
           <a:p>
-            <a:r>
-              <a:rPr lang="de-DE" dirty="0"/>
-              <a:t>Fugenstellen ges. =</a:t>
-            </a:r>
-            <a:r>
-              <a:rPr lang="de-DE" baseline="0" dirty="0"/>
-              <a:t> eine reihe nur aus 1er Klötzen -&gt; n Fugen – 1 (Ende nicht)</a:t>
-            </a:r>
             <a:endParaRPr lang="de-DE" dirty="0"/>
           </a:p>
         </p:txBody>
@@ -858,14 +822,6 @@
           <a:bodyPr/>
           <a:lstStyle/>
           <a:p>
-            <a:r>
-              <a:rPr lang="de-DE" dirty="0"/>
-              <a:t>Fugenstell. Pro Reih.</a:t>
-            </a:r>
-            <a:r>
-              <a:rPr lang="de-DE" baseline="0" dirty="0"/>
-              <a:t> = n Klötze – 1 (Ende nicht)</a:t>
-            </a:r>
             <a:endParaRPr lang="de-DE" dirty="0"/>
           </a:p>
         </p:txBody>
@@ -950,20 +906,6 @@
           <a:bodyPr/>
           <a:lstStyle/>
           <a:p>
-            <a:r>
-              <a:rPr lang="de-DE" dirty="0"/>
-              <a:t>f (10) = 6</a:t>
-            </a:r>
-          </a:p>
-          <a:p>
-            <a:r>
-              <a:rPr lang="de-DE" dirty="0"/>
-              <a:t>f (3) ≈ 2,5</a:t>
-            </a:r>
-            <a:r>
-              <a:rPr lang="de-DE" baseline="0" dirty="0"/>
-              <a:t>   =&gt; ABRUNDEN</a:t>
-            </a:r>
             <a:endParaRPr lang="de-DE" dirty="0"/>
           </a:p>
         </p:txBody>
@@ -1049,14 +991,13 @@
           <a:lstStyle/>
           <a:p>
             <a:r>
-              <a:rPr lang="de-DE" dirty="0"/>
-              <a:t>Problem</a:t>
+              <a:rPr lang="de-DE" b="1" dirty="0"/>
+              <a:t>Bekanntes Problem: </a:t>
             </a:r>
             <a:r>
-              <a:rPr lang="de-DE" baseline="0" dirty="0"/>
-              <a:t> mit vielen Möglichkeiten</a:t>
+              <a:rPr lang="de-DE" b="0" dirty="0"/>
+              <a:t>Sehr viele Möglichkeiten!</a:t>
             </a:r>
-            <a:endParaRPr lang="de-DE" dirty="0"/>
           </a:p>
         </p:txBody>
       </p:sp>
@@ -1142,11 +1083,11 @@
           <a:p>
             <a:r>
               <a:rPr lang="de-DE" dirty="0"/>
-              <a:t>Neuer</a:t>
+              <a:t>Neue Möglichkeit </a:t>
             </a:r>
             <a:r>
               <a:rPr lang="de-DE" baseline="0" dirty="0"/>
-              <a:t> Weg durch vordefinierte Höhe</a:t>
+              <a:t>durch vordefinierte Höhe</a:t>
             </a:r>
             <a:endParaRPr lang="de-DE" dirty="0"/>
           </a:p>
@@ -1232,10 +1173,7 @@
           <a:bodyPr/>
           <a:lstStyle/>
           <a:p>
-            <a:r>
-              <a:rPr lang="de-DE" dirty="0"/>
-              <a:t>Labyrinth</a:t>
-            </a:r>
+            <a:endParaRPr lang="de-DE" dirty="0"/>
           </a:p>
         </p:txBody>
       </p:sp>
@@ -1319,26 +1257,6 @@
           <a:bodyPr/>
           <a:lstStyle/>
           <a:p>
-            <a:r>
-              <a:rPr lang="de-DE" dirty="0"/>
-              <a:t>3</a:t>
-            </a:r>
-            <a:r>
-              <a:rPr lang="de-DE" baseline="0" dirty="0"/>
-              <a:t> weitere Möglichkeiten</a:t>
-            </a:r>
-          </a:p>
-          <a:p>
-            <a:r>
-              <a:rPr lang="de-DE" baseline="0" dirty="0"/>
-              <a:t>Den richtigen nicht so einfach erkennen </a:t>
-            </a:r>
-          </a:p>
-          <a:p>
-            <a:r>
-              <a:rPr lang="de-DE" baseline="0" dirty="0"/>
-              <a:t>Backtracking</a:t>
-            </a:r>
             <a:endParaRPr lang="de-DE" dirty="0"/>
           </a:p>
         </p:txBody>
@@ -1423,14 +1341,6 @@
           <a:bodyPr/>
           <a:lstStyle/>
           <a:p>
-            <a:r>
-              <a:rPr lang="de-DE" dirty="0"/>
-              <a:t>( Reihe</a:t>
-            </a:r>
-            <a:r>
-              <a:rPr lang="de-DE" baseline="0" dirty="0"/>
-              <a:t> | Klotz )</a:t>
-            </a:r>
             <a:endParaRPr lang="de-DE" dirty="0"/>
           </a:p>
         </p:txBody>
@@ -1599,25 +1509,26 @@
           <a:bodyPr/>
           <a:lstStyle/>
           <a:p>
-            <a:r>
-              <a:rPr lang="de-DE" dirty="0"/>
-              <a:t>Anzahl</a:t>
-            </a:r>
+            <a:pPr marL="0" marR="0" lvl="0" indent="0" algn="l" defTabSz="914400" rtl="0" eaLnBrk="1" fontAlgn="auto" latinLnBrk="0" hangingPunct="1">
+              <a:lnSpc>
+                <a:spcPct val="100000"/>
+              </a:lnSpc>
+              <a:spcBef>
+                <a:spcPts val="0"/>
+              </a:spcBef>
+              <a:spcAft>
+                <a:spcPts val="0"/>
+              </a:spcAft>
+              <a:buClrTx/>
+              <a:buSzTx/>
+              <a:buFontTx/>
+              <a:buNone/>
+              <a:tabLst/>
+              <a:defRPr/>
+            </a:pPr>
             <a:r>
               <a:rPr lang="de-DE" baseline="0" dirty="0"/>
-              <a:t> Möglichkeiten für verbleibende 7 Bilder</a:t>
-            </a:r>
-          </a:p>
-          <a:p>
-            <a:r>
-              <a:rPr lang="de-DE" baseline="0" dirty="0"/>
-              <a:t>Lösungshinweis -&gt; Stock/Schild nach unten ≠ untere Reihe, Stock/Schild nach oben ≠ obere Reihe</a:t>
-            </a:r>
-          </a:p>
-          <a:p>
-            <a:r>
-              <a:rPr lang="de-DE" baseline="0" dirty="0"/>
-              <a:t>Nur ein Schild nach unten -&gt; 6! Möglichkeiten</a:t>
+              <a:t>Informatik Biber 2017</a:t>
             </a:r>
             <a:endParaRPr lang="de-DE" dirty="0"/>
           </a:p>
@@ -1703,10 +1614,7 @@
           <a:bodyPr/>
           <a:lstStyle/>
           <a:p>
-            <a:r>
-              <a:rPr lang="de-DE" sz="3600" b="1" dirty="0"/>
-              <a:t>Programm starten!</a:t>
-            </a:r>
+            <a:endParaRPr lang="de-DE" sz="3600" b="0" dirty="0"/>
           </a:p>
         </p:txBody>
       </p:sp>
@@ -2061,7 +1969,7 @@
             </a:r>
             <a:r>
               <a:rPr lang="de-DE" dirty="0"/>
-              <a:t> optimierter Algorithmus mit ~ 3 Minuten für Lösung</a:t>
+              <a:t> optimierter Algorithmus mit Lösung in ~ 3 Minuten</a:t>
             </a:r>
           </a:p>
         </p:txBody>
@@ -2230,26 +2138,6 @@
           <a:bodyPr/>
           <a:lstStyle/>
           <a:p>
-            <a:r>
-              <a:rPr lang="de-DE" dirty="0"/>
-              <a:t>3</a:t>
-            </a:r>
-            <a:r>
-              <a:rPr lang="de-DE" baseline="0" dirty="0"/>
-              <a:t> weitere Möglichkeiten</a:t>
-            </a:r>
-          </a:p>
-          <a:p>
-            <a:r>
-              <a:rPr lang="de-DE" baseline="0" dirty="0"/>
-              <a:t>Den richtigen nicht so einfach erkennen</a:t>
-            </a:r>
-          </a:p>
-          <a:p>
-            <a:r>
-              <a:rPr lang="de-DE" baseline="0" dirty="0"/>
-              <a:t>Rumprobieren (Backtracking)</a:t>
-            </a:r>
             <a:endParaRPr lang="de-DE" dirty="0"/>
           </a:p>
         </p:txBody>
@@ -2418,44 +2306,6 @@
           <a:bodyPr/>
           <a:lstStyle/>
           <a:p>
-            <a:r>
-              <a:rPr lang="de-DE" dirty="0"/>
-              <a:t>Verschiedene</a:t>
-            </a:r>
-            <a:r>
-              <a:rPr lang="de-DE" baseline="0" dirty="0"/>
-              <a:t> Längen</a:t>
-            </a:r>
-          </a:p>
-          <a:p>
-            <a:r>
-              <a:rPr lang="de-DE" baseline="0" dirty="0"/>
-              <a:t>Variable</a:t>
-            </a:r>
-          </a:p>
-          <a:p>
-            <a:r>
-              <a:rPr lang="de-DE" baseline="0" dirty="0"/>
-              <a:t>Jede Reihe gleiche Anzahl Klötzchen</a:t>
-            </a:r>
-          </a:p>
-          <a:p>
-            <a:r>
-              <a:rPr lang="de-DE" baseline="0" dirty="0"/>
-              <a:t>Längen 1 bis n</a:t>
-            </a:r>
-          </a:p>
-          <a:p>
-            <a:r>
-              <a:rPr lang="de-DE" baseline="0" dirty="0"/>
-              <a:t>Nie zwei Fugen überlappen</a:t>
-            </a:r>
-          </a:p>
-          <a:p>
-            <a:r>
-              <a:rPr lang="de-DE" baseline="0" dirty="0"/>
-              <a:t>Mauer möglichst hoch</a:t>
-            </a:r>
             <a:endParaRPr lang="de-DE" dirty="0"/>
           </a:p>
         </p:txBody>
@@ -2540,20 +2390,6 @@
           <a:bodyPr/>
           <a:lstStyle/>
           <a:p>
-            <a:r>
-              <a:rPr lang="de-DE" dirty="0"/>
-              <a:t>Aufgabenstellung</a:t>
-            </a:r>
-          </a:p>
-          <a:p>
-            <a:r>
-              <a:rPr lang="de-DE" dirty="0"/>
-              <a:t>Spätere</a:t>
-            </a:r>
-            <a:r>
-              <a:rPr lang="de-DE" baseline="0" dirty="0"/>
-              <a:t> Kontrolle</a:t>
-            </a:r>
             <a:endParaRPr lang="de-DE" dirty="0"/>
           </a:p>
         </p:txBody>
@@ -2638,20 +2474,6 @@
           <a:bodyPr/>
           <a:lstStyle/>
           <a:p>
-            <a:r>
-              <a:rPr lang="de-DE" dirty="0"/>
-              <a:t>Nur Stellen zwischen Klötzchen.</a:t>
-            </a:r>
-          </a:p>
-          <a:p>
-            <a:r>
-              <a:rPr lang="de-DE" b="1" dirty="0"/>
-              <a:t>NICHT</a:t>
-            </a:r>
-            <a:r>
-              <a:rPr lang="de-DE" baseline="0" dirty="0"/>
-              <a:t> Anfang und Ende!</a:t>
-            </a:r>
             <a:endParaRPr lang="de-DE" dirty="0"/>
           </a:p>
         </p:txBody>
@@ -2736,22 +2558,7 @@
           <a:bodyPr/>
           <a:lstStyle/>
           <a:p>
-            <a:r>
-              <a:rPr lang="de-DE" b="0" dirty="0"/>
-              <a:t>Verstanden?</a:t>
-            </a:r>
-          </a:p>
-          <a:p>
-            <a:r>
-              <a:rPr lang="de-DE" b="1" dirty="0"/>
-              <a:t>Aufgabe</a:t>
-            </a:r>
-          </a:p>
-          <a:p>
-            <a:r>
-              <a:rPr lang="de-DE" dirty="0"/>
-              <a:t>Mauer N = 4</a:t>
-            </a:r>
+            <a:endParaRPr lang="de-DE" dirty="0"/>
           </a:p>
         </p:txBody>
       </p:sp>
@@ -2837,7 +2644,7 @@
           <a:p>
             <a:r>
               <a:rPr lang="de-DE" dirty="0"/>
-              <a:t>Mehrere Lösungen</a:t>
+              <a:t>Mehrere mögliche Lösungen!</a:t>
             </a:r>
           </a:p>
         </p:txBody>
@@ -19080,7 +18887,7 @@
           <a:p>
             <a:r>
               <a:rPr lang="de-DE" sz="6000" dirty="0"/>
-              <a:t>Wie bauen wir jetzt so eine Mauer?</a:t>
+              <a:t>Wie baut man jetzt so eine Mauer?</a:t>
             </a:r>
           </a:p>
         </p:txBody>
@@ -19230,6 +19037,58 @@
           </a:p>
         </p:txBody>
       </p:sp>
+      <p:sp>
+        <p:nvSpPr>
+          <p:cNvPr id="3" name="Rechteck 2">
+            <a:extLst>
+              <a:ext uri="{FF2B5EF4-FFF2-40B4-BE49-F238E27FC236}">
+                <a16:creationId xmlns:a16="http://schemas.microsoft.com/office/drawing/2014/main" id="{A8843998-00FF-4050-83E2-C08FF641304E}"/>
+              </a:ext>
+            </a:extLst>
+          </p:cNvPr>
+          <p:cNvSpPr/>
+          <p:nvPr/>
+        </p:nvSpPr>
+        <p:spPr>
+          <a:xfrm>
+            <a:off x="6200775" y="3629026"/>
+            <a:ext cx="4643438" cy="1185862"/>
+          </a:xfrm>
+          <a:prstGeom prst="rect">
+            <a:avLst/>
+          </a:prstGeom>
+          <a:noFill/>
+          <a:ln w="76200">
+            <a:solidFill>
+              <a:srgbClr val="C00000"/>
+            </a:solidFill>
+          </a:ln>
+        </p:spPr>
+        <p:style>
+          <a:lnRef idx="2">
+            <a:schemeClr val="accent1">
+              <a:shade val="50000"/>
+            </a:schemeClr>
+          </a:lnRef>
+          <a:fillRef idx="1">
+            <a:schemeClr val="accent1"/>
+          </a:fillRef>
+          <a:effectRef idx="0">
+            <a:schemeClr val="accent1"/>
+          </a:effectRef>
+          <a:fontRef idx="minor">
+            <a:schemeClr val="lt1"/>
+          </a:fontRef>
+        </p:style>
+        <p:txBody>
+          <a:bodyPr rtlCol="0" anchor="ctr"/>
+          <a:lstStyle/>
+          <a:p>
+            <a:pPr algn="ctr"/>
+            <a:endParaRPr lang="de-DE"/>
+          </a:p>
+        </p:txBody>
+      </p:sp>
     </p:spTree>
     <p:extLst>
       <p:ext uri="{BB962C8B-B14F-4D97-AF65-F5344CB8AC3E}">
@@ -19252,6 +19111,92 @@
       </p:transition>
     </mc:Fallback>
   </mc:AlternateContent>
+  <p:timing>
+    <p:tnLst>
+      <p:par>
+        <p:cTn id="1" dur="indefinite" restart="never" nodeType="tmRoot">
+          <p:childTnLst>
+            <p:seq concurrent="1" nextAc="seek">
+              <p:cTn id="2" dur="indefinite" nodeType="mainSeq">
+                <p:childTnLst>
+                  <p:par>
+                    <p:cTn id="3" fill="hold">
+                      <p:stCondLst>
+                        <p:cond delay="indefinite"/>
+                      </p:stCondLst>
+                      <p:childTnLst>
+                        <p:par>
+                          <p:cTn id="4" fill="hold">
+                            <p:stCondLst>
+                              <p:cond delay="0"/>
+                            </p:stCondLst>
+                            <p:childTnLst>
+                              <p:par>
+                                <p:cTn id="5" presetID="10" presetClass="entr" presetSubtype="0" fill="hold" grpId="0" nodeType="clickEffect">
+                                  <p:stCondLst>
+                                    <p:cond delay="0"/>
+                                  </p:stCondLst>
+                                  <p:childTnLst>
+                                    <p:set>
+                                      <p:cBhvr>
+                                        <p:cTn id="6" dur="1" fill="hold">
+                                          <p:stCondLst>
+                                            <p:cond delay="0"/>
+                                          </p:stCondLst>
+                                        </p:cTn>
+                                        <p:tgtEl>
+                                          <p:spTgt spid="3"/>
+                                        </p:tgtEl>
+                                        <p:attrNameLst>
+                                          <p:attrName>style.visibility</p:attrName>
+                                        </p:attrNameLst>
+                                      </p:cBhvr>
+                                      <p:to>
+                                        <p:strVal val="visible"/>
+                                      </p:to>
+                                    </p:set>
+                                    <p:animEffect transition="in" filter="fade">
+                                      <p:cBhvr>
+                                        <p:cTn id="7" dur="500"/>
+                                        <p:tgtEl>
+                                          <p:spTgt spid="3"/>
+                                        </p:tgtEl>
+                                      </p:cBhvr>
+                                    </p:animEffect>
+                                  </p:childTnLst>
+                                </p:cTn>
+                              </p:par>
+                            </p:childTnLst>
+                          </p:cTn>
+                        </p:par>
+                      </p:childTnLst>
+                    </p:cTn>
+                  </p:par>
+                </p:childTnLst>
+              </p:cTn>
+              <p:prevCondLst>
+                <p:cond evt="onPrev" delay="0">
+                  <p:tgtEl>
+                    <p:sldTgt/>
+                  </p:tgtEl>
+                </p:cond>
+              </p:prevCondLst>
+              <p:nextCondLst>
+                <p:cond evt="onNext" delay="0">
+                  <p:tgtEl>
+                    <p:sldTgt/>
+                  </p:tgtEl>
+                </p:cond>
+              </p:nextCondLst>
+            </p:seq>
+          </p:childTnLst>
+        </p:cTn>
+      </p:par>
+    </p:tnLst>
+    <p:bldLst>
+      <p:bldP spid="3" grpId="0" animBg="1"/>
+    </p:bldLst>
+  </p:timing>
 </p:sld>
 </file>
 

</xml_diff>